<commit_message>
Update Covid-19 KSA analysis v2 final draft.pptx
</commit_message>
<xml_diff>
--- a/Covid-19 KSA analysis v2 final draft.pptx
+++ b/Covid-19 KSA analysis v2 final draft.pptx
@@ -39158,7 +39158,7 @@
           <a:p>
             <a:fld id="{48A87A34-81AB-432B-8DAE-1953F412C126}" type="datetimeFigureOut">
               <a:rPr lang="en-US" dirty="0"/>
-              <a:t>3/6/2024</a:t>
+              <a:t>3/27/2024</a:t>
             </a:fld>
             <a:endParaRPr lang="en-US" dirty="0"/>
           </a:p>
@@ -39420,7 +39420,7 @@
           <a:p>
             <a:fld id="{48A87A34-81AB-432B-8DAE-1953F412C126}" type="datetimeFigureOut">
               <a:rPr lang="en-US" dirty="0"/>
-              <a:t>3/6/2024</a:t>
+              <a:t>3/27/2024</a:t>
             </a:fld>
             <a:endParaRPr lang="en-US" dirty="0"/>
           </a:p>
@@ -39647,7 +39647,7 @@
             <a:fld id="{48A87A34-81AB-432B-8DAE-1953F412C126}" type="datetimeFigureOut">
               <a:rPr lang="en-US" dirty="0"/>
               <a:pPr/>
-              <a:t>3/6/2024</a:t>
+              <a:t>3/27/2024</a:t>
             </a:fld>
             <a:endParaRPr lang="en-US" dirty="0"/>
           </a:p>
@@ -39953,7 +39953,7 @@
             <a:fld id="{48A87A34-81AB-432B-8DAE-1953F412C126}" type="datetimeFigureOut">
               <a:rPr lang="en-US" dirty="0"/>
               <a:pPr/>
-              <a:t>3/6/2024</a:t>
+              <a:t>3/27/2024</a:t>
             </a:fld>
             <a:endParaRPr lang="en-US" dirty="0"/>
           </a:p>
@@ -40422,7 +40422,7 @@
             <a:fld id="{48A87A34-81AB-432B-8DAE-1953F412C126}" type="datetimeFigureOut">
               <a:rPr lang="en-US" dirty="0"/>
               <a:pPr/>
-              <a:t>3/6/2024</a:t>
+              <a:t>3/27/2024</a:t>
             </a:fld>
             <a:endParaRPr lang="en-US" dirty="0"/>
           </a:p>
@@ -40964,7 +40964,7 @@
           <a:p>
             <a:fld id="{48A87A34-81AB-432B-8DAE-1953F412C126}" type="datetimeFigureOut">
               <a:rPr lang="en-US" dirty="0"/>
-              <a:t>3/6/2024</a:t>
+              <a:t>3/27/2024</a:t>
             </a:fld>
             <a:endParaRPr lang="en-US" dirty="0"/>
           </a:p>
@@ -41733,7 +41733,7 @@
           <a:p>
             <a:fld id="{48A87A34-81AB-432B-8DAE-1953F412C126}" type="datetimeFigureOut">
               <a:rPr lang="en-US" dirty="0"/>
-              <a:t>3/6/2024</a:t>
+              <a:t>3/27/2024</a:t>
             </a:fld>
             <a:endParaRPr lang="en-US" dirty="0"/>
           </a:p>
@@ -41903,7 +41903,7 @@
           <a:p>
             <a:fld id="{48A87A34-81AB-432B-8DAE-1953F412C126}" type="datetimeFigureOut">
               <a:rPr lang="en-US" dirty="0"/>
-              <a:t>3/6/2024</a:t>
+              <a:t>3/27/2024</a:t>
             </a:fld>
             <a:endParaRPr lang="en-US" dirty="0"/>
           </a:p>
@@ -42122,7 +42122,7 @@
             <a:fld id="{48A87A34-81AB-432B-8DAE-1953F412C126}" type="datetimeFigureOut">
               <a:rPr lang="en-US" dirty="0"/>
               <a:pPr/>
-              <a:t>3/6/2024</a:t>
+              <a:t>3/27/2024</a:t>
             </a:fld>
             <a:endParaRPr lang="en-US" dirty="0"/>
           </a:p>
@@ -42297,7 +42297,7 @@
           <a:p>
             <a:fld id="{48A87A34-81AB-432B-8DAE-1953F412C126}" type="datetimeFigureOut">
               <a:rPr lang="en-US" dirty="0"/>
-              <a:t>3/6/2024</a:t>
+              <a:t>3/27/2024</a:t>
             </a:fld>
             <a:endParaRPr lang="en-US" dirty="0"/>
           </a:p>
@@ -42582,7 +42582,7 @@
             <a:fld id="{48A87A34-81AB-432B-8DAE-1953F412C126}" type="datetimeFigureOut">
               <a:rPr lang="en-US" dirty="0"/>
               <a:pPr/>
-              <a:t>3/6/2024</a:t>
+              <a:t>3/27/2024</a:t>
             </a:fld>
             <a:endParaRPr lang="en-US" dirty="0"/>
           </a:p>
@@ -42819,7 +42819,7 @@
           <a:p>
             <a:fld id="{48A87A34-81AB-432B-8DAE-1953F412C126}" type="datetimeFigureOut">
               <a:rPr lang="en-US" dirty="0"/>
-              <a:t>3/6/2024</a:t>
+              <a:t>3/27/2024</a:t>
             </a:fld>
             <a:endParaRPr lang="en-US" dirty="0"/>
           </a:p>
@@ -43193,7 +43193,7 @@
           <a:p>
             <a:fld id="{48A87A34-81AB-432B-8DAE-1953F412C126}" type="datetimeFigureOut">
               <a:rPr lang="en-US" dirty="0"/>
-              <a:t>3/6/2024</a:t>
+              <a:t>3/27/2024</a:t>
             </a:fld>
             <a:endParaRPr lang="en-US" dirty="0"/>
           </a:p>
@@ -43306,7 +43306,7 @@
           <a:p>
             <a:fld id="{48A87A34-81AB-432B-8DAE-1953F412C126}" type="datetimeFigureOut">
               <a:rPr lang="en-US" dirty="0"/>
-              <a:t>3/6/2024</a:t>
+              <a:t>3/27/2024</a:t>
             </a:fld>
             <a:endParaRPr lang="en-US" dirty="0"/>
           </a:p>
@@ -43396,7 +43396,7 @@
           <a:p>
             <a:fld id="{48A87A34-81AB-432B-8DAE-1953F412C126}" type="datetimeFigureOut">
               <a:rPr lang="en-US" dirty="0"/>
-              <a:t>3/6/2024</a:t>
+              <a:t>3/27/2024</a:t>
             </a:fld>
             <a:endParaRPr lang="en-US" dirty="0"/>
           </a:p>
@@ -43640,7 +43640,7 @@
           <a:p>
             <a:fld id="{48A87A34-81AB-432B-8DAE-1953F412C126}" type="datetimeFigureOut">
               <a:rPr lang="en-US" dirty="0"/>
-              <a:t>3/6/2024</a:t>
+              <a:t>3/27/2024</a:t>
             </a:fld>
             <a:endParaRPr lang="en-US" dirty="0"/>
           </a:p>
@@ -43892,7 +43892,7 @@
           <a:p>
             <a:fld id="{48A87A34-81AB-432B-8DAE-1953F412C126}" type="datetimeFigureOut">
               <a:rPr lang="en-US" dirty="0"/>
-              <a:t>3/6/2024</a:t>
+              <a:t>3/27/2024</a:t>
             </a:fld>
             <a:endParaRPr lang="en-US" dirty="0"/>
           </a:p>
@@ -44131,7 +44131,7 @@
             <a:fld id="{48A87A34-81AB-432B-8DAE-1953F412C126}" type="datetimeFigureOut">
               <a:rPr lang="en-US" dirty="0"/>
               <a:pPr/>
-              <a:t>3/6/2024</a:t>
+              <a:t>3/27/2024</a:t>
             </a:fld>
             <a:endParaRPr lang="en-US" dirty="0"/>
           </a:p>
@@ -45540,15 +45540,7 @@
             <a:pPr algn="ctr"/>
             <a:r>
               <a:rPr lang="en-ZA" sz="900" dirty="0"/>
-              <a:t>No quarantine relaxation on the cards as yet </a:t>
-            </a:r>
-            <a:r>
-              <a:rPr lang="en-ZA" sz="900" dirty="0" err="1"/>
-              <a:t>locdown</a:t>
-            </a:r>
-            <a:r>
-              <a:rPr lang="en-ZA" sz="900" dirty="0"/>
-              <a:t> to continue until 14 May</a:t>
+              <a:t>No quarantine relaxation on the cards as yet lockdown to continue until 14 May</a:t>
             </a:r>
           </a:p>
         </p:txBody>
@@ -45776,15 +45768,7 @@
             <a:pPr algn="ctr"/>
             <a:r>
               <a:rPr lang="en-ZA" sz="900" dirty="0"/>
-              <a:t>No quarantine relaxation on the cards as yet and lockdown to remain </a:t>
-            </a:r>
-            <a:r>
-              <a:rPr lang="en-ZA" sz="900" dirty="0" err="1"/>
-              <a:t>untiol</a:t>
-            </a:r>
-            <a:r>
-              <a:rPr lang="en-ZA" sz="900" dirty="0"/>
-              <a:t> 11 May</a:t>
+              <a:t>No quarantine relaxation on the cards as yet and lockdown to remain until 11 May</a:t>
             </a:r>
           </a:p>
         </p:txBody>
@@ -49587,9 +49571,12 @@
 </file>
 
 <file path=customXml/item1.xml><?xml version="1.0" encoding="utf-8"?>
-<p:properties xmlns:p="http://schemas.microsoft.com/office/2006/metadata/properties" xmlns:xsi="http://www.w3.org/2001/XMLSchema-instance" xmlns:pc="http://schemas.microsoft.com/office/infopath/2007/PartnerControls">
-  <documentManagement/>
-</p:properties>
+<?mso-contentType ?>
+<FormTemplates xmlns="http://schemas.microsoft.com/sharepoint/v3/contenttype/forms">
+  <Display>DocumentLibraryForm</Display>
+  <Edit>DocumentLibraryForm</Edit>
+  <New>DocumentLibraryForm</New>
+</FormTemplates>
 </file>
 
 <file path=customXml/item2.xml><?xml version="1.0" encoding="utf-8"?>
@@ -49816,27 +49803,15 @@
 </file>
 
 <file path=customXml/item3.xml><?xml version="1.0" encoding="utf-8"?>
-<?mso-contentType ?>
-<FormTemplates xmlns="http://schemas.microsoft.com/sharepoint/v3/contenttype/forms">
-  <Display>DocumentLibraryForm</Display>
-  <Edit>DocumentLibraryForm</Edit>
-  <New>DocumentLibraryForm</New>
-</FormTemplates>
+<p:properties xmlns:p="http://schemas.microsoft.com/office/2006/metadata/properties" xmlns:xsi="http://www.w3.org/2001/XMLSchema-instance" xmlns:pc="http://schemas.microsoft.com/office/infopath/2007/PartnerControls">
+  <documentManagement/>
+</p:properties>
 </file>
 
 <file path=customXml/itemProps1.xml><?xml version="1.0" encoding="utf-8"?>
-<ds:datastoreItem xmlns:ds="http://schemas.openxmlformats.org/officeDocument/2006/customXml" ds:itemID="{7F142AFF-A8FE-4BA0-A05A-04CD89BBC0F3}">
+<ds:datastoreItem xmlns:ds="http://schemas.openxmlformats.org/officeDocument/2006/customXml" ds:itemID="{AE69085C-FB5D-4B40-AD9B-3541B9D81032}">
   <ds:schemaRefs>
-    <ds:schemaRef ds:uri="2dae4811-80b4-40ba-861c-1aa94aa23910"/>
-    <ds:schemaRef ds:uri="http://schemas.openxmlformats.org/package/2006/metadata/core-properties"/>
-    <ds:schemaRef ds:uri="http://schemas.microsoft.com/office/2006/documentManagement/types"/>
-    <ds:schemaRef ds:uri="http://purl.org/dc/terms/"/>
-    <ds:schemaRef ds:uri="http://purl.org/dc/elements/1.1/"/>
-    <ds:schemaRef ds:uri="http://purl.org/dc/dcmitype/"/>
-    <ds:schemaRef ds:uri="http://schemas.microsoft.com/office/infopath/2007/PartnerControls"/>
-    <ds:schemaRef ds:uri="6e197a47-7baa-42d8-b476-8f565fcb1acc"/>
-    <ds:schemaRef ds:uri="http://schemas.microsoft.com/office/2006/metadata/properties"/>
-    <ds:schemaRef ds:uri="http://www.w3.org/XML/1998/namespace"/>
+    <ds:schemaRef ds:uri="http://schemas.microsoft.com/sharepoint/v3/contenttype/forms"/>
   </ds:schemaRefs>
 </ds:datastoreItem>
 </file>
@@ -49861,9 +49836,18 @@
 </file>
 
 <file path=customXml/itemProps3.xml><?xml version="1.0" encoding="utf-8"?>
-<ds:datastoreItem xmlns:ds="http://schemas.openxmlformats.org/officeDocument/2006/customXml" ds:itemID="{AE69085C-FB5D-4B40-AD9B-3541B9D81032}">
+<ds:datastoreItem xmlns:ds="http://schemas.openxmlformats.org/officeDocument/2006/customXml" ds:itemID="{7F142AFF-A8FE-4BA0-A05A-04CD89BBC0F3}">
   <ds:schemaRefs>
-    <ds:schemaRef ds:uri="http://schemas.microsoft.com/sharepoint/v3/contenttype/forms"/>
+    <ds:schemaRef ds:uri="2dae4811-80b4-40ba-861c-1aa94aa23910"/>
+    <ds:schemaRef ds:uri="http://schemas.openxmlformats.org/package/2006/metadata/core-properties"/>
+    <ds:schemaRef ds:uri="http://schemas.microsoft.com/office/2006/documentManagement/types"/>
+    <ds:schemaRef ds:uri="http://purl.org/dc/terms/"/>
+    <ds:schemaRef ds:uri="http://purl.org/dc/elements/1.1/"/>
+    <ds:schemaRef ds:uri="http://purl.org/dc/dcmitype/"/>
+    <ds:schemaRef ds:uri="http://schemas.microsoft.com/office/infopath/2007/PartnerControls"/>
+    <ds:schemaRef ds:uri="6e197a47-7baa-42d8-b476-8f565fcb1acc"/>
+    <ds:schemaRef ds:uri="http://schemas.microsoft.com/office/2006/metadata/properties"/>
+    <ds:schemaRef ds:uri="http://www.w3.org/XML/1998/namespace"/>
   </ds:schemaRefs>
 </ds:datastoreItem>
 </file>
</xml_diff>